<commit_message>
new updates coming your way!
</commit_message>
<xml_diff>
--- a/doc/round 3 presentation.pptx
+++ b/doc/round 3 presentation.pptx
@@ -5457,13 +5457,13 @@
   <p:clrMapOvr>
     <a:masterClrMapping/>
   </p:clrMapOvr>
-  <mc:AlternateContent xmlns:mc="http://schemas.openxmlformats.org/markup-compatibility/2006">
-    <mc:Choice xmlns:p159="http://schemas.microsoft.com/office/powerpoint/2015/09/main" Requires="p159">
+  <mc:AlternateContent xmlns:mc="http://schemas.openxmlformats.org/markup-compatibility/2006" xmlns:p159="http://schemas.microsoft.com/office/powerpoint/2015/09/main">
+    <mc:Choice Requires="p159">
       <p:transition xmlns:p14="http://schemas.microsoft.com/office/powerpoint/2010/main" spd="slow" p14:dur="2000">
         <p159:morph option="byObject"/>
       </p:transition>
     </mc:Choice>
-    <mc:Fallback>
+    <mc:Fallback xmlns="">
       <p:transition spd="slow">
         <p:fade/>
       </p:transition>
@@ -5928,13 +5928,13 @@
   <p:clrMapOvr>
     <a:masterClrMapping/>
   </p:clrMapOvr>
-  <mc:AlternateContent xmlns:mc="http://schemas.openxmlformats.org/markup-compatibility/2006">
-    <mc:Choice xmlns:p159="http://schemas.microsoft.com/office/powerpoint/2015/09/main" Requires="p159">
+  <mc:AlternateContent xmlns:mc="http://schemas.openxmlformats.org/markup-compatibility/2006" xmlns:p159="http://schemas.microsoft.com/office/powerpoint/2015/09/main">
+    <mc:Choice Requires="p159">
       <p:transition xmlns:p14="http://schemas.microsoft.com/office/powerpoint/2010/main" spd="slow" p14:dur="2000">
         <p159:morph option="byObject"/>
       </p:transition>
     </mc:Choice>
-    <mc:Fallback>
+    <mc:Fallback xmlns="">
       <p:transition spd="slow">
         <p:fade/>
       </p:transition>
@@ -6910,13 +6910,13 @@
   <p:clrMapOvr>
     <a:masterClrMapping/>
   </p:clrMapOvr>
-  <mc:AlternateContent xmlns:mc="http://schemas.openxmlformats.org/markup-compatibility/2006">
-    <mc:Choice xmlns:p159="http://schemas.microsoft.com/office/powerpoint/2015/09/main" Requires="p159">
+  <mc:AlternateContent xmlns:mc="http://schemas.openxmlformats.org/markup-compatibility/2006" xmlns:p159="http://schemas.microsoft.com/office/powerpoint/2015/09/main">
+    <mc:Choice Requires="p159">
       <p:transition xmlns:p14="http://schemas.microsoft.com/office/powerpoint/2010/main" spd="slow" p14:dur="2000">
         <p159:morph option="byObject"/>
       </p:transition>
     </mc:Choice>
-    <mc:Fallback>
+    <mc:Fallback xmlns="">
       <p:transition spd="slow">
         <p:fade/>
       </p:transition>

</xml_diff>